<commit_message>
adding SOL standards and switch as DUT board
</commit_message>
<xml_diff>
--- a/CPWG.pptx
+++ b/CPWG.pptx
@@ -8,6 +8,10 @@
     <p:sldId id="256" r:id="rId2"/>
     <p:sldId id="257" r:id="rId3"/>
     <p:sldId id="258" r:id="rId4"/>
+    <p:sldId id="260" r:id="rId5"/>
+    <p:sldId id="261" r:id="rId6"/>
+    <p:sldId id="262" r:id="rId7"/>
+    <p:sldId id="259" r:id="rId8"/>
   </p:sldIdLst>
   <p:sldSz cx="12192000" cy="6858000"/>
   <p:notesSz cx="6858000" cy="9144000"/>
@@ -106,6 +110,11 @@
       </a:defRPr>
     </a:lvl9pPr>
   </p:defaultTextStyle>
+  <p:extLst>
+    <p:ext uri="{EFAFB233-063F-42B5-8137-9DF3F51BA10A}">
+      <p15:sldGuideLst xmlns:p15="http://schemas.microsoft.com/office/powerpoint/2012/main"/>
+    </p:ext>
+  </p:extLst>
 </p:presentation>
 </file>
 
@@ -256,7 +265,7 @@
           <a:p>
             <a:fld id="{60C5F823-E1C5-4D86-B6C8-258F65A46826}" type="datetimeFigureOut">
               <a:rPr lang="en-US" smtClean="0"/>
-              <a:t>1/9/2026</a:t>
+              <a:t>1/12/2026</a:t>
             </a:fld>
             <a:endParaRPr lang="en-US"/>
           </a:p>
@@ -454,7 +463,7 @@
           <a:p>
             <a:fld id="{60C5F823-E1C5-4D86-B6C8-258F65A46826}" type="datetimeFigureOut">
               <a:rPr lang="en-US" smtClean="0"/>
-              <a:t>1/9/2026</a:t>
+              <a:t>1/12/2026</a:t>
             </a:fld>
             <a:endParaRPr lang="en-US"/>
           </a:p>
@@ -662,7 +671,7 @@
           <a:p>
             <a:fld id="{60C5F823-E1C5-4D86-B6C8-258F65A46826}" type="datetimeFigureOut">
               <a:rPr lang="en-US" smtClean="0"/>
-              <a:t>1/9/2026</a:t>
+              <a:t>1/12/2026</a:t>
             </a:fld>
             <a:endParaRPr lang="en-US"/>
           </a:p>
@@ -860,7 +869,7 @@
           <a:p>
             <a:fld id="{60C5F823-E1C5-4D86-B6C8-258F65A46826}" type="datetimeFigureOut">
               <a:rPr lang="en-US" smtClean="0"/>
-              <a:t>1/9/2026</a:t>
+              <a:t>1/12/2026</a:t>
             </a:fld>
             <a:endParaRPr lang="en-US"/>
           </a:p>
@@ -1135,7 +1144,7 @@
           <a:p>
             <a:fld id="{60C5F823-E1C5-4D86-B6C8-258F65A46826}" type="datetimeFigureOut">
               <a:rPr lang="en-US" smtClean="0"/>
-              <a:t>1/9/2026</a:t>
+              <a:t>1/12/2026</a:t>
             </a:fld>
             <a:endParaRPr lang="en-US"/>
           </a:p>
@@ -1400,7 +1409,7 @@
           <a:p>
             <a:fld id="{60C5F823-E1C5-4D86-B6C8-258F65A46826}" type="datetimeFigureOut">
               <a:rPr lang="en-US" smtClean="0"/>
-              <a:t>1/9/2026</a:t>
+              <a:t>1/12/2026</a:t>
             </a:fld>
             <a:endParaRPr lang="en-US"/>
           </a:p>
@@ -1812,7 +1821,7 @@
           <a:p>
             <a:fld id="{60C5F823-E1C5-4D86-B6C8-258F65A46826}" type="datetimeFigureOut">
               <a:rPr lang="en-US" smtClean="0"/>
-              <a:t>1/9/2026</a:t>
+              <a:t>1/12/2026</a:t>
             </a:fld>
             <a:endParaRPr lang="en-US"/>
           </a:p>
@@ -1953,7 +1962,7 @@
           <a:p>
             <a:fld id="{60C5F823-E1C5-4D86-B6C8-258F65A46826}" type="datetimeFigureOut">
               <a:rPr lang="en-US" smtClean="0"/>
-              <a:t>1/9/2026</a:t>
+              <a:t>1/12/2026</a:t>
             </a:fld>
             <a:endParaRPr lang="en-US"/>
           </a:p>
@@ -2066,7 +2075,7 @@
           <a:p>
             <a:fld id="{60C5F823-E1C5-4D86-B6C8-258F65A46826}" type="datetimeFigureOut">
               <a:rPr lang="en-US" smtClean="0"/>
-              <a:t>1/9/2026</a:t>
+              <a:t>1/12/2026</a:t>
             </a:fld>
             <a:endParaRPr lang="en-US"/>
           </a:p>
@@ -2377,7 +2386,7 @@
           <a:p>
             <a:fld id="{60C5F823-E1C5-4D86-B6C8-258F65A46826}" type="datetimeFigureOut">
               <a:rPr lang="en-US" smtClean="0"/>
-              <a:t>1/9/2026</a:t>
+              <a:t>1/12/2026</a:t>
             </a:fld>
             <a:endParaRPr lang="en-US"/>
           </a:p>
@@ -2665,7 +2674,7 @@
           <a:p>
             <a:fld id="{60C5F823-E1C5-4D86-B6C8-258F65A46826}" type="datetimeFigureOut">
               <a:rPr lang="en-US" smtClean="0"/>
-              <a:t>1/9/2026</a:t>
+              <a:t>1/12/2026</a:t>
             </a:fld>
             <a:endParaRPr lang="en-US"/>
           </a:p>
@@ -2906,7 +2915,7 @@
           <a:p>
             <a:fld id="{60C5F823-E1C5-4D86-B6C8-258F65A46826}" type="datetimeFigureOut">
               <a:rPr lang="en-US" smtClean="0"/>
-              <a:t>1/9/2026</a:t>
+              <a:t>1/12/2026</a:t>
             </a:fld>
             <a:endParaRPr lang="en-US"/>
           </a:p>
@@ -3560,24 +3569,410 @@
         </p:nvPicPr>
         <p:blipFill>
           <a:blip r:embed="rId2"/>
+          <a:srcRect t="2013"/>
+          <a:stretch/>
+        </p:blipFill>
+        <p:spPr>
+          <a:xfrm>
+            <a:off x="1274198" y="0"/>
+            <a:ext cx="8902172" cy="6407614"/>
+          </a:xfrm>
+          <a:prstGeom prst="rect">
+            <a:avLst/>
+          </a:prstGeom>
+        </p:spPr>
+      </p:pic>
+      <p:sp>
+        <p:nvSpPr>
+          <p:cNvPr id="3" name="TextBox 2">
+            <a:extLst>
+              <a:ext uri="{FF2B5EF4-FFF2-40B4-BE49-F238E27FC236}">
+                <a16:creationId xmlns:a16="http://schemas.microsoft.com/office/drawing/2014/main" id="{F1B7956C-7CC8-28D5-B18A-05DAF22A56D6}"/>
+              </a:ext>
+            </a:extLst>
+          </p:cNvPr>
+          <p:cNvSpPr txBox="1"/>
+          <p:nvPr/>
+        </p:nvSpPr>
+        <p:spPr>
+          <a:xfrm>
+            <a:off x="1274198" y="6407614"/>
+            <a:ext cx="10422171" cy="369332"/>
+          </a:xfrm>
+          <a:prstGeom prst="rect">
+            <a:avLst/>
+          </a:prstGeom>
+          <a:noFill/>
+        </p:spPr>
+        <p:txBody>
+          <a:bodyPr wrap="square">
+            <a:spAutoFit/>
+          </a:bodyPr>
+          <a:lstStyle/>
+          <a:p>
+            <a:r>
+              <a:rPr lang="en-US" dirty="0">
+                <a:hlinkClick r:id="rId3"/>
+              </a:rPr>
+              <a:t>https://mpd.southwestmicrowave.com/wp-content/uploads/End-Launch-Connectors-2024.pdf</a:t>
+            </a:r>
+            <a:r>
+              <a:rPr lang="en-US" dirty="0"/>
+              <a:t> </a:t>
+            </a:r>
+          </a:p>
+        </p:txBody>
+      </p:sp>
+    </p:spTree>
+    <p:extLst>
+      <p:ext uri="{BB962C8B-B14F-4D97-AF65-F5344CB8AC3E}">
+        <p14:creationId xmlns:p14="http://schemas.microsoft.com/office/powerpoint/2010/main" val="258847520"/>
+      </p:ext>
+    </p:extLst>
+  </p:cSld>
+  <p:clrMapOvr>
+    <a:masterClrMapping/>
+  </p:clrMapOvr>
+</p:sld>
+</file>
+
+<file path=ppt/slides/slide4.xml><?xml version="1.0" encoding="utf-8"?>
+<p:sld xmlns:a="http://schemas.openxmlformats.org/drawingml/2006/main" xmlns:r="http://schemas.openxmlformats.org/officeDocument/2006/relationships" xmlns:p="http://schemas.openxmlformats.org/presentationml/2006/main">
+  <p:cSld>
+    <p:spTree>
+      <p:nvGrpSpPr>
+        <p:cNvPr id="1" name=""/>
+        <p:cNvGrpSpPr/>
+        <p:nvPr/>
+      </p:nvGrpSpPr>
+      <p:grpSpPr>
+        <a:xfrm>
+          <a:off x="0" y="0"/>
+          <a:ext cx="0" cy="0"/>
+          <a:chOff x="0" y="0"/>
+          <a:chExt cx="0" cy="0"/>
+        </a:xfrm>
+      </p:grpSpPr>
+      <p:pic>
+        <p:nvPicPr>
+          <p:cNvPr id="5" name="Picture 4">
+            <a:extLst>
+              <a:ext uri="{FF2B5EF4-FFF2-40B4-BE49-F238E27FC236}">
+                <a16:creationId xmlns:a16="http://schemas.microsoft.com/office/drawing/2014/main" id="{93B1C7D5-30DC-DC94-793A-FAC3B89353C2}"/>
+              </a:ext>
+            </a:extLst>
+          </p:cNvPr>
+          <p:cNvPicPr>
+            <a:picLocks noChangeAspect="1"/>
+          </p:cNvPicPr>
+          <p:nvPr/>
+        </p:nvPicPr>
+        <p:blipFill>
+          <a:blip r:embed="rId2"/>
           <a:stretch>
             <a:fillRect/>
           </a:stretch>
         </p:blipFill>
         <p:spPr>
           <a:xfrm>
-            <a:off x="1443853" y="113154"/>
-            <a:ext cx="9028015" cy="6631691"/>
+            <a:off x="909156" y="277489"/>
+            <a:ext cx="8688012" cy="4458322"/>
           </a:xfrm>
           <a:prstGeom prst="rect">
             <a:avLst/>
           </a:prstGeom>
         </p:spPr>
       </p:pic>
+      <p:sp>
+        <p:nvSpPr>
+          <p:cNvPr id="6" name="Rectangle 5">
+            <a:extLst>
+              <a:ext uri="{FF2B5EF4-FFF2-40B4-BE49-F238E27FC236}">
+                <a16:creationId xmlns:a16="http://schemas.microsoft.com/office/drawing/2014/main" id="{8A61120F-FE40-E00A-406A-6AD8AC4315B7}"/>
+              </a:ext>
+            </a:extLst>
+          </p:cNvPr>
+          <p:cNvSpPr/>
+          <p:nvPr/>
+        </p:nvSpPr>
+        <p:spPr>
+          <a:xfrm>
+            <a:off x="3148717" y="2506650"/>
+            <a:ext cx="874643" cy="665920"/>
+          </a:xfrm>
+          <a:prstGeom prst="rect">
+            <a:avLst/>
+          </a:prstGeom>
+          <a:solidFill>
+            <a:srgbClr val="FFFF00">
+              <a:alpha val="23000"/>
+            </a:srgbClr>
+          </a:solidFill>
+          <a:ln>
+            <a:noFill/>
+          </a:ln>
+        </p:spPr>
+        <p:style>
+          <a:lnRef idx="2">
+            <a:schemeClr val="accent1">
+              <a:shade val="15000"/>
+            </a:schemeClr>
+          </a:lnRef>
+          <a:fillRef idx="1">
+            <a:schemeClr val="accent1"/>
+          </a:fillRef>
+          <a:effectRef idx="0">
+            <a:schemeClr val="accent1"/>
+          </a:effectRef>
+          <a:fontRef idx="minor">
+            <a:schemeClr val="lt1"/>
+          </a:fontRef>
+        </p:style>
+        <p:txBody>
+          <a:bodyPr rtlCol="0" anchor="ctr"/>
+          <a:lstStyle/>
+          <a:p>
+            <a:pPr algn="ctr"/>
+            <a:endParaRPr lang="en-US" dirty="0"/>
+          </a:p>
+        </p:txBody>
+      </p:sp>
     </p:spTree>
     <p:extLst>
       <p:ext uri="{BB962C8B-B14F-4D97-AF65-F5344CB8AC3E}">
-        <p14:creationId xmlns:p14="http://schemas.microsoft.com/office/powerpoint/2010/main" val="258847520"/>
+        <p14:creationId xmlns:p14="http://schemas.microsoft.com/office/powerpoint/2010/main" val="2772793600"/>
+      </p:ext>
+    </p:extLst>
+  </p:cSld>
+  <p:clrMapOvr>
+    <a:masterClrMapping/>
+  </p:clrMapOvr>
+</p:sld>
+</file>
+
+<file path=ppt/slides/slide5.xml><?xml version="1.0" encoding="utf-8"?>
+<p:sld xmlns:a="http://schemas.openxmlformats.org/drawingml/2006/main" xmlns:r="http://schemas.openxmlformats.org/officeDocument/2006/relationships" xmlns:p="http://schemas.openxmlformats.org/presentationml/2006/main">
+  <p:cSld>
+    <p:spTree>
+      <p:nvGrpSpPr>
+        <p:cNvPr id="1" name=""/>
+        <p:cNvGrpSpPr/>
+        <p:nvPr/>
+      </p:nvGrpSpPr>
+      <p:grpSpPr>
+        <a:xfrm>
+          <a:off x="0" y="0"/>
+          <a:ext cx="0" cy="0"/>
+          <a:chOff x="0" y="0"/>
+          <a:chExt cx="0" cy="0"/>
+        </a:xfrm>
+      </p:grpSpPr>
+      <p:pic>
+        <p:nvPicPr>
+          <p:cNvPr id="5" name="Picture 4">
+            <a:extLst>
+              <a:ext uri="{FF2B5EF4-FFF2-40B4-BE49-F238E27FC236}">
+                <a16:creationId xmlns:a16="http://schemas.microsoft.com/office/drawing/2014/main" id="{9320A081-BDF6-35E4-5D53-098E0C173B0F}"/>
+              </a:ext>
+            </a:extLst>
+          </p:cNvPr>
+          <p:cNvPicPr>
+            <a:picLocks noChangeAspect="1"/>
+          </p:cNvPicPr>
+          <p:nvPr/>
+        </p:nvPicPr>
+        <p:blipFill>
+          <a:blip r:embed="rId2"/>
+          <a:stretch>
+            <a:fillRect/>
+          </a:stretch>
+        </p:blipFill>
+        <p:spPr>
+          <a:xfrm>
+            <a:off x="1710300" y="0"/>
+            <a:ext cx="8115282" cy="6047295"/>
+          </a:xfrm>
+          <a:prstGeom prst="rect">
+            <a:avLst/>
+          </a:prstGeom>
+        </p:spPr>
+      </p:pic>
+      <p:sp>
+        <p:nvSpPr>
+          <p:cNvPr id="7" name="TextBox 6">
+            <a:extLst>
+              <a:ext uri="{FF2B5EF4-FFF2-40B4-BE49-F238E27FC236}">
+                <a16:creationId xmlns:a16="http://schemas.microsoft.com/office/drawing/2014/main" id="{86E8B7F4-F622-93E7-5587-14D9B9579B74}"/>
+              </a:ext>
+            </a:extLst>
+          </p:cNvPr>
+          <p:cNvSpPr txBox="1"/>
+          <p:nvPr/>
+        </p:nvSpPr>
+        <p:spPr>
+          <a:xfrm>
+            <a:off x="2491033" y="5854294"/>
+            <a:ext cx="6094428" cy="923330"/>
+          </a:xfrm>
+          <a:prstGeom prst="rect">
+            <a:avLst/>
+          </a:prstGeom>
+          <a:noFill/>
+        </p:spPr>
+        <p:txBody>
+          <a:bodyPr wrap="square">
+            <a:spAutoFit/>
+          </a:bodyPr>
+          <a:lstStyle/>
+          <a:p>
+            <a:r>
+              <a:rPr lang="en-US" dirty="0">
+                <a:hlinkClick r:id="rId3"/>
+              </a:rPr>
+              <a:t>https://mpd.southwestmicrowave.com/product/292-04a-12-end-launch-supersma-27-ghz-jack-female-standard-block-500-thread-in/</a:t>
+            </a:r>
+            <a:r>
+              <a:rPr lang="en-US" dirty="0"/>
+              <a:t> </a:t>
+            </a:r>
+          </a:p>
+        </p:txBody>
+      </p:sp>
+    </p:spTree>
+    <p:extLst>
+      <p:ext uri="{BB962C8B-B14F-4D97-AF65-F5344CB8AC3E}">
+        <p14:creationId xmlns:p14="http://schemas.microsoft.com/office/powerpoint/2010/main" val="424552852"/>
+      </p:ext>
+    </p:extLst>
+  </p:cSld>
+  <p:clrMapOvr>
+    <a:masterClrMapping/>
+  </p:clrMapOvr>
+</p:sld>
+</file>
+
+<file path=ppt/slides/slide6.xml><?xml version="1.0" encoding="utf-8"?>
+<p:sld xmlns:a="http://schemas.openxmlformats.org/drawingml/2006/main" xmlns:r="http://schemas.openxmlformats.org/officeDocument/2006/relationships" xmlns:p="http://schemas.openxmlformats.org/presentationml/2006/main">
+  <p:cSld>
+    <p:spTree>
+      <p:nvGrpSpPr>
+        <p:cNvPr id="1" name=""/>
+        <p:cNvGrpSpPr/>
+        <p:nvPr/>
+      </p:nvGrpSpPr>
+      <p:grpSpPr>
+        <a:xfrm>
+          <a:off x="0" y="0"/>
+          <a:ext cx="0" cy="0"/>
+          <a:chOff x="0" y="0"/>
+          <a:chExt cx="0" cy="0"/>
+        </a:xfrm>
+      </p:grpSpPr>
+    </p:spTree>
+    <p:extLst>
+      <p:ext uri="{BB962C8B-B14F-4D97-AF65-F5344CB8AC3E}">
+        <p14:creationId xmlns:p14="http://schemas.microsoft.com/office/powerpoint/2010/main" val="1044578281"/>
+      </p:ext>
+    </p:extLst>
+  </p:cSld>
+  <p:clrMapOvr>
+    <a:masterClrMapping/>
+  </p:clrMapOvr>
+</p:sld>
+</file>
+
+<file path=ppt/slides/slide7.xml><?xml version="1.0" encoding="utf-8"?>
+<p:sld xmlns:a="http://schemas.openxmlformats.org/drawingml/2006/main" xmlns:r="http://schemas.openxmlformats.org/officeDocument/2006/relationships" xmlns:p="http://schemas.openxmlformats.org/presentationml/2006/main">
+  <p:cSld>
+    <p:spTree>
+      <p:nvGrpSpPr>
+        <p:cNvPr id="1" name=""/>
+        <p:cNvGrpSpPr/>
+        <p:nvPr/>
+      </p:nvGrpSpPr>
+      <p:grpSpPr>
+        <a:xfrm>
+          <a:off x="0" y="0"/>
+          <a:ext cx="0" cy="0"/>
+          <a:chOff x="0" y="0"/>
+          <a:chExt cx="0" cy="0"/>
+        </a:xfrm>
+      </p:grpSpPr>
+      <p:pic>
+        <p:nvPicPr>
+          <p:cNvPr id="5" name="Picture 4">
+            <a:extLst>
+              <a:ext uri="{FF2B5EF4-FFF2-40B4-BE49-F238E27FC236}">
+                <a16:creationId xmlns:a16="http://schemas.microsoft.com/office/drawing/2014/main" id="{451CCB6D-E11A-1D5A-EB46-2CC41F91D079}"/>
+              </a:ext>
+            </a:extLst>
+          </p:cNvPr>
+          <p:cNvPicPr>
+            <a:picLocks noChangeAspect="1"/>
+          </p:cNvPicPr>
+          <p:nvPr/>
+        </p:nvPicPr>
+        <p:blipFill>
+          <a:blip r:embed="rId2"/>
+          <a:stretch>
+            <a:fillRect/>
+          </a:stretch>
+        </p:blipFill>
+        <p:spPr>
+          <a:xfrm>
+            <a:off x="944453" y="170134"/>
+            <a:ext cx="6680847" cy="4858160"/>
+          </a:xfrm>
+          <a:prstGeom prst="rect">
+            <a:avLst/>
+          </a:prstGeom>
+        </p:spPr>
+      </p:pic>
+      <p:sp>
+        <p:nvSpPr>
+          <p:cNvPr id="7" name="TextBox 6">
+            <a:extLst>
+              <a:ext uri="{FF2B5EF4-FFF2-40B4-BE49-F238E27FC236}">
+                <a16:creationId xmlns:a16="http://schemas.microsoft.com/office/drawing/2014/main" id="{4C029EFD-560C-6CD9-2E7F-D952DF7A22CB}"/>
+              </a:ext>
+            </a:extLst>
+          </p:cNvPr>
+          <p:cNvSpPr txBox="1"/>
+          <p:nvPr/>
+        </p:nvSpPr>
+        <p:spPr>
+          <a:xfrm>
+            <a:off x="2888312" y="5616459"/>
+            <a:ext cx="6094674" cy="646331"/>
+          </a:xfrm>
+          <a:prstGeom prst="rect">
+            <a:avLst/>
+          </a:prstGeom>
+          <a:noFill/>
+        </p:spPr>
+        <p:txBody>
+          <a:bodyPr wrap="square">
+            <a:spAutoFit/>
+          </a:bodyPr>
+          <a:lstStyle/>
+          <a:p>
+            <a:r>
+              <a:rPr lang="en-US" dirty="0">
+                <a:hlinkClick r:id="rId3"/>
+              </a:rPr>
+              <a:t>https://www.digikey.com/en/products/detail/te-connectivity-linx/CONSMA020-031-G/11482823</a:t>
+            </a:r>
+            <a:r>
+              <a:rPr lang="en-US" dirty="0"/>
+              <a:t> </a:t>
+            </a:r>
+          </a:p>
+        </p:txBody>
+      </p:sp>
+    </p:spTree>
+    <p:extLst>
+      <p:ext uri="{BB962C8B-B14F-4D97-AF65-F5344CB8AC3E}">
+        <p14:creationId xmlns:p14="http://schemas.microsoft.com/office/powerpoint/2010/main" val="4189502823"/>
       </p:ext>
     </p:extLst>
   </p:cSld>

</xml_diff>